<commit_message>
Finished presentation for 01.09
</commit_message>
<xml_diff>
--- a/Meeting Presentations/01.09.2022_Meeting.pptx
+++ b/Meeting Presentations/01.09.2022_Meeting.pptx
@@ -18,9 +18,10 @@
     <p:sldId id="261" r:id="rId15"/>
     <p:sldId id="262" r:id="rId16"/>
     <p:sldId id="263" r:id="rId17"/>
-    <p:sldId id="264" r:id="rId18"/>
-    <p:sldId id="269" r:id="rId19"/>
-    <p:sldId id="268" r:id="rId20"/>
+    <p:sldId id="272" r:id="rId18"/>
+    <p:sldId id="264" r:id="rId19"/>
+    <p:sldId id="269" r:id="rId20"/>
+    <p:sldId id="268" r:id="rId21"/>
   </p:sldIdLst>
   <p:sldSz cx="12192000" cy="6858000"/>
   <p:notesSz cx="6858000" cy="9144000"/>
@@ -589,7 +590,7 @@
           <a:p>
             <a:fld id="{02AC24A9-CCB6-4F8D-B8DB-C2F3692CFA5A}" type="datetimeFigureOut">
               <a:rPr lang="en-US" smtClean="0"/>
-              <a:t>8/29/2022</a:t>
+              <a:t>8/31/2022</a:t>
             </a:fld>
             <a:endParaRPr lang="en-US" dirty="0"/>
           </a:p>
@@ -959,7 +960,7 @@
           <a:p>
             <a:fld id="{02AC24A9-CCB6-4F8D-B8DB-C2F3692CFA5A}" type="datetimeFigureOut">
               <a:rPr lang="en-US" smtClean="0"/>
-              <a:t>8/29/2022</a:t>
+              <a:t>8/31/2022</a:t>
             </a:fld>
             <a:endParaRPr lang="en-US"/>
           </a:p>
@@ -1168,7 +1169,7 @@
           <a:p>
             <a:fld id="{02AC24A9-CCB6-4F8D-B8DB-C2F3692CFA5A}" type="datetimeFigureOut">
               <a:rPr lang="en-US" smtClean="0"/>
-              <a:t>8/29/2022</a:t>
+              <a:t>8/31/2022</a:t>
             </a:fld>
             <a:endParaRPr lang="en-US"/>
           </a:p>
@@ -1638,7 +1639,7 @@
           <a:p>
             <a:fld id="{02AC24A9-CCB6-4F8D-B8DB-C2F3692CFA5A}" type="datetimeFigureOut">
               <a:rPr lang="en-US" smtClean="0"/>
-              <a:t>8/29/2022</a:t>
+              <a:t>8/31/2022</a:t>
             </a:fld>
             <a:endParaRPr lang="en-US"/>
           </a:p>
@@ -2092,7 +2093,7 @@
           <a:p>
             <a:fld id="{02AC24A9-CCB6-4F8D-B8DB-C2F3692CFA5A}" type="datetimeFigureOut">
               <a:rPr lang="en-US" smtClean="0"/>
-              <a:t>8/29/2022</a:t>
+              <a:t>8/31/2022</a:t>
             </a:fld>
             <a:endParaRPr lang="en-US"/>
           </a:p>
@@ -2624,7 +2625,7 @@
           <a:p>
             <a:fld id="{02AC24A9-CCB6-4F8D-B8DB-C2F3692CFA5A}" type="datetimeFigureOut">
               <a:rPr lang="en-US" smtClean="0"/>
-              <a:t>8/29/2022</a:t>
+              <a:t>8/31/2022</a:t>
             </a:fld>
             <a:endParaRPr lang="en-US"/>
           </a:p>
@@ -3323,7 +3324,7 @@
           <a:p>
             <a:fld id="{02AC24A9-CCB6-4F8D-B8DB-C2F3692CFA5A}" type="datetimeFigureOut">
               <a:rPr lang="en-US" smtClean="0"/>
-              <a:t>8/29/2022</a:t>
+              <a:t>8/31/2022</a:t>
             </a:fld>
             <a:endParaRPr lang="en-US"/>
           </a:p>
@@ -3652,7 +3653,7 @@
           <a:p>
             <a:fld id="{02AC24A9-CCB6-4F8D-B8DB-C2F3692CFA5A}" type="datetimeFigureOut">
               <a:rPr lang="en-US" smtClean="0"/>
-              <a:t>8/29/2022</a:t>
+              <a:t>8/31/2022</a:t>
             </a:fld>
             <a:endParaRPr lang="en-US"/>
           </a:p>
@@ -3765,7 +3766,7 @@
           <a:p>
             <a:fld id="{02AC24A9-CCB6-4F8D-B8DB-C2F3692CFA5A}" type="datetimeFigureOut">
               <a:rPr lang="en-US" smtClean="0"/>
-              <a:t>8/29/2022</a:t>
+              <a:t>8/31/2022</a:t>
             </a:fld>
             <a:endParaRPr lang="en-US"/>
           </a:p>
@@ -4260,7 +4261,7 @@
           <a:p>
             <a:fld id="{02AC24A9-CCB6-4F8D-B8DB-C2F3692CFA5A}" type="datetimeFigureOut">
               <a:rPr lang="en-US" smtClean="0"/>
-              <a:t>8/29/2022</a:t>
+              <a:t>8/31/2022</a:t>
             </a:fld>
             <a:endParaRPr lang="en-US" dirty="0"/>
           </a:p>
@@ -4737,7 +4738,7 @@
           <a:p>
             <a:fld id="{02AC24A9-CCB6-4F8D-B8DB-C2F3692CFA5A}" type="datetimeFigureOut">
               <a:rPr lang="en-US" smtClean="0"/>
-              <a:t>8/29/2022</a:t>
+              <a:t>8/31/2022</a:t>
             </a:fld>
             <a:endParaRPr lang="en-US"/>
           </a:p>
@@ -4980,7 +4981,7 @@
           <a:p>
             <a:fld id="{02AC24A9-CCB6-4F8D-B8DB-C2F3692CFA5A}" type="datetimeFigureOut">
               <a:rPr lang="en-US" smtClean="0"/>
-              <a:t>8/29/2022</a:t>
+              <a:t>8/31/2022</a:t>
             </a:fld>
             <a:endParaRPr lang="en-US"/>
           </a:p>
@@ -7959,7 +7960,7 @@
           <p:cNvPr id="2" name="Title 1">
             <a:extLst>
               <a:ext uri="{FF2B5EF4-FFF2-40B4-BE49-F238E27FC236}">
-                <a16:creationId xmlns:a16="http://schemas.microsoft.com/office/drawing/2014/main" id="{D1FA454F-487C-4A90-9ED9-11F6F58DC691}"/>
+                <a16:creationId xmlns:a16="http://schemas.microsoft.com/office/drawing/2014/main" id="{3B529F85-051E-4FAC-A40F-51ED8AE1EB14}"/>
               </a:ext>
             </a:extLst>
           </p:cNvPr>
@@ -7977,62 +7978,129 @@
           <a:p>
             <a:r>
               <a:rPr lang="nb-NO" dirty="0" err="1"/>
-              <a:t>Next</a:t>
-            </a:r>
-            <a:r>
-              <a:rPr lang="nb-NO" dirty="0"/>
-              <a:t> </a:t>
-            </a:r>
-            <a:r>
-              <a:rPr lang="nb-NO" dirty="0" err="1"/>
-              <a:t>meeting</a:t>
+              <a:t>Accessing</a:t>
+            </a:r>
+            <a:r>
+              <a:rPr lang="nb-NO" dirty="0"/>
+              <a:t> </a:t>
+            </a:r>
+            <a:r>
+              <a:rPr lang="nb-NO" dirty="0" err="1"/>
+              <a:t>the</a:t>
+            </a:r>
+            <a:r>
+              <a:rPr lang="nb-NO" dirty="0"/>
+              <a:t> team</a:t>
             </a:r>
             <a:endParaRPr lang="en-GB" dirty="0"/>
           </a:p>
         </p:txBody>
       </p:sp>
+      <p:pic>
+        <p:nvPicPr>
+          <p:cNvPr id="5" name="Picture 4">
+            <a:extLst>
+              <a:ext uri="{FF2B5EF4-FFF2-40B4-BE49-F238E27FC236}">
+                <a16:creationId xmlns:a16="http://schemas.microsoft.com/office/drawing/2014/main" id="{0BB2F3EC-41D5-423F-BD7D-2F0BA007FC29}"/>
+              </a:ext>
+            </a:extLst>
+          </p:cNvPr>
+          <p:cNvPicPr>
+            <a:picLocks noChangeAspect="1"/>
+          </p:cNvPicPr>
+          <p:nvPr/>
+        </p:nvPicPr>
+        <p:blipFill>
+          <a:blip r:embed="rId2"/>
+          <a:stretch>
+            <a:fillRect/>
+          </a:stretch>
+        </p:blipFill>
+        <p:spPr>
+          <a:xfrm>
+            <a:off x="1566862" y="2261235"/>
+            <a:ext cx="4067175" cy="4048125"/>
+          </a:xfrm>
+          <a:prstGeom prst="rect">
+            <a:avLst/>
+          </a:prstGeom>
+        </p:spPr>
+      </p:pic>
       <p:sp>
         <p:nvSpPr>
-          <p:cNvPr id="3" name="Content Placeholder 2">
-            <a:extLst>
-              <a:ext uri="{FF2B5EF4-FFF2-40B4-BE49-F238E27FC236}">
-                <a16:creationId xmlns:a16="http://schemas.microsoft.com/office/drawing/2014/main" id="{EEDE0348-4BAD-4DC6-A630-22EDE1929B6C}"/>
-              </a:ext>
-            </a:extLst>
-          </p:cNvPr>
-          <p:cNvSpPr>
-            <a:spLocks noGrp="1"/>
-          </p:cNvSpPr>
-          <p:nvPr>
-            <p:ph idx="1"/>
-          </p:nvPr>
-        </p:nvSpPr>
-        <p:spPr/>
-        <p:txBody>
-          <a:bodyPr>
-            <a:normAutofit fontScale="85000" lnSpcReduction="20000"/>
+          <p:cNvPr id="6" name="TextBox 5">
+            <a:extLst>
+              <a:ext uri="{FF2B5EF4-FFF2-40B4-BE49-F238E27FC236}">
+                <a16:creationId xmlns:a16="http://schemas.microsoft.com/office/drawing/2014/main" id="{BA3252E8-1450-4C2A-99A2-CF2530B554FC}"/>
+              </a:ext>
+            </a:extLst>
+          </p:cNvPr>
+          <p:cNvSpPr txBox="1"/>
+          <p:nvPr/>
+        </p:nvSpPr>
+        <p:spPr>
+          <a:xfrm>
+            <a:off x="7086600" y="3962245"/>
+            <a:ext cx="3629025" cy="646331"/>
+          </a:xfrm>
+          <a:prstGeom prst="rect">
+            <a:avLst/>
+          </a:prstGeom>
+          <a:noFill/>
+        </p:spPr>
+        <p:txBody>
+          <a:bodyPr wrap="square" rtlCol="0">
+            <a:spAutoFit/>
           </a:bodyPr>
           <a:lstStyle/>
           <a:p>
             <a:r>
-              <a:rPr lang="nb-NO" dirty="0" err="1"/>
-              <a:t>I’m</a:t>
-            </a:r>
-            <a:r>
-              <a:rPr lang="nb-NO" dirty="0"/>
-              <a:t> planning to </a:t>
-            </a:r>
-            <a:r>
-              <a:rPr lang="nb-NO" dirty="0" err="1"/>
-              <a:t>schedule</a:t>
-            </a:r>
-            <a:r>
-              <a:rPr lang="nb-NO" dirty="0"/>
-              <a:t> a ML </a:t>
-            </a:r>
-            <a:r>
-              <a:rPr lang="nb-NO" dirty="0" err="1"/>
-              <a:t>meeting</a:t>
+              <a:rPr lang="nb-NO" dirty="0"/>
+              <a:t>It </a:t>
+            </a:r>
+            <a:r>
+              <a:rPr lang="nb-NO" dirty="0" err="1"/>
+              <a:t>might</a:t>
+            </a:r>
+            <a:r>
+              <a:rPr lang="nb-NO" dirty="0"/>
+              <a:t> </a:t>
+            </a:r>
+            <a:r>
+              <a:rPr lang="nb-NO" dirty="0" err="1"/>
+              <a:t>take</a:t>
+            </a:r>
+            <a:r>
+              <a:rPr lang="nb-NO" dirty="0"/>
+              <a:t> a </a:t>
+            </a:r>
+            <a:r>
+              <a:rPr lang="nb-NO" dirty="0" err="1"/>
+              <a:t>little</a:t>
+            </a:r>
+            <a:r>
+              <a:rPr lang="nb-NO" dirty="0"/>
+              <a:t> </a:t>
+            </a:r>
+            <a:r>
+              <a:rPr lang="nb-NO" dirty="0" err="1"/>
+              <a:t>while</a:t>
+            </a:r>
+            <a:r>
+              <a:rPr lang="nb-NO" dirty="0"/>
+              <a:t> </a:t>
+            </a:r>
+            <a:r>
+              <a:rPr lang="nb-NO" dirty="0" err="1"/>
+              <a:t>before</a:t>
+            </a:r>
+            <a:r>
+              <a:rPr lang="nb-NO" dirty="0"/>
+              <a:t> it </a:t>
+            </a:r>
+            <a:r>
+              <a:rPr lang="nb-NO" dirty="0" err="1"/>
+              <a:t>appears</a:t>
             </a:r>
             <a:r>
               <a:rPr lang="nb-NO" dirty="0"/>
@@ -8040,101 +8108,20 @@
             </a:r>
             <a:r>
               <a:rPr lang="nb-NO" dirty="0" err="1"/>
-              <a:t>two</a:t>
-            </a:r>
-            <a:r>
-              <a:rPr lang="nb-NO" dirty="0"/>
-              <a:t> </a:t>
-            </a:r>
-            <a:r>
-              <a:rPr lang="nb-NO" dirty="0" err="1"/>
-              <a:t>weeks</a:t>
-            </a:r>
-            <a:r>
-              <a:rPr lang="nb-NO" dirty="0"/>
-              <a:t> [14.09.2022]</a:t>
+              <a:t>your</a:t>
+            </a:r>
+            <a:r>
+              <a:rPr lang="nb-NO" dirty="0"/>
+              <a:t> MS Teams</a:t>
             </a:r>
             <a:endParaRPr lang="en-GB" dirty="0"/>
-          </a:p>
-          <a:p>
-            <a:r>
-              <a:rPr lang="en-GB" dirty="0"/>
-              <a:t>By then I want to have:</a:t>
-            </a:r>
-          </a:p>
-          <a:p>
-            <a:pPr lvl="1"/>
-            <a:r>
-              <a:rPr lang="en-GB" dirty="0"/>
-              <a:t>Implemented all needed architectures</a:t>
-            </a:r>
-          </a:p>
-          <a:p>
-            <a:pPr lvl="1"/>
-            <a:r>
-              <a:rPr lang="en-GB" dirty="0"/>
-              <a:t>Implemented transfer learning loss functions</a:t>
-            </a:r>
-          </a:p>
-          <a:p>
-            <a:pPr lvl="1"/>
-            <a:r>
-              <a:rPr lang="en-GB" dirty="0"/>
-              <a:t>Implemented logging script</a:t>
-            </a:r>
-          </a:p>
-          <a:p>
-            <a:pPr lvl="1"/>
-            <a:r>
-              <a:rPr lang="en-GB" dirty="0"/>
-              <a:t>Gotten familiar with loading the data from NGI’s TNW folder (</a:t>
-            </a:r>
-            <a:r>
-              <a:rPr lang="en-GB" dirty="0" err="1"/>
-              <a:t>OpendTect</a:t>
-            </a:r>
-            <a:r>
-              <a:rPr lang="en-GB" dirty="0"/>
-              <a:t> etc.)</a:t>
-            </a:r>
-          </a:p>
-          <a:p>
-            <a:pPr lvl="1"/>
-            <a:r>
-              <a:rPr lang="en-GB" dirty="0"/>
-              <a:t>Ran at least one algorithm with summary statistics</a:t>
-            </a:r>
-          </a:p>
-          <a:p>
-            <a:pPr lvl="1"/>
-            <a:endParaRPr lang="en-GB" dirty="0"/>
-          </a:p>
-          <a:p>
-            <a:r>
-              <a:rPr lang="en-GB" dirty="0"/>
-              <a:t>Or at the very least have better questions to ask for guidance</a:t>
-            </a:r>
-          </a:p>
-          <a:p>
-            <a:r>
-              <a:rPr lang="en-GB" dirty="0"/>
-              <a:t>Next general meeting in one month [06.10.2022]</a:t>
-            </a:r>
-          </a:p>
-          <a:p>
-            <a:pPr lvl="1"/>
-            <a:r>
-              <a:rPr lang="en-GB" dirty="0"/>
-              <a:t>It will be beneficial for me to give status updates along the way and sharing plans ahead</a:t>
-            </a:r>
-            <a:endParaRPr lang="nb-NO" dirty="0"/>
           </a:p>
         </p:txBody>
       </p:sp>
     </p:spTree>
     <p:extLst>
       <p:ext uri="{BB962C8B-B14F-4D97-AF65-F5344CB8AC3E}">
-        <p14:creationId xmlns:p14="http://schemas.microsoft.com/office/powerpoint/2010/main" val="2242473429"/>
+        <p14:creationId xmlns:p14="http://schemas.microsoft.com/office/powerpoint/2010/main" val="3828456986"/>
       </p:ext>
     </p:extLst>
   </p:cSld>
@@ -8163,6 +8150,213 @@
       </p:grpSpPr>
       <p:sp>
         <p:nvSpPr>
+          <p:cNvPr id="2" name="Title 1">
+            <a:extLst>
+              <a:ext uri="{FF2B5EF4-FFF2-40B4-BE49-F238E27FC236}">
+                <a16:creationId xmlns:a16="http://schemas.microsoft.com/office/drawing/2014/main" id="{D1FA454F-487C-4A90-9ED9-11F6F58DC691}"/>
+              </a:ext>
+            </a:extLst>
+          </p:cNvPr>
+          <p:cNvSpPr>
+            <a:spLocks noGrp="1"/>
+          </p:cNvSpPr>
+          <p:nvPr>
+            <p:ph type="title"/>
+          </p:nvPr>
+        </p:nvSpPr>
+        <p:spPr/>
+        <p:txBody>
+          <a:bodyPr/>
+          <a:lstStyle/>
+          <a:p>
+            <a:r>
+              <a:rPr lang="nb-NO" dirty="0" err="1"/>
+              <a:t>Next</a:t>
+            </a:r>
+            <a:r>
+              <a:rPr lang="nb-NO" dirty="0"/>
+              <a:t> </a:t>
+            </a:r>
+            <a:r>
+              <a:rPr lang="nb-NO" dirty="0" err="1"/>
+              <a:t>meeting</a:t>
+            </a:r>
+            <a:endParaRPr lang="en-GB" dirty="0"/>
+          </a:p>
+        </p:txBody>
+      </p:sp>
+      <p:sp>
+        <p:nvSpPr>
+          <p:cNvPr id="3" name="Content Placeholder 2">
+            <a:extLst>
+              <a:ext uri="{FF2B5EF4-FFF2-40B4-BE49-F238E27FC236}">
+                <a16:creationId xmlns:a16="http://schemas.microsoft.com/office/drawing/2014/main" id="{EEDE0348-4BAD-4DC6-A630-22EDE1929B6C}"/>
+              </a:ext>
+            </a:extLst>
+          </p:cNvPr>
+          <p:cNvSpPr>
+            <a:spLocks noGrp="1"/>
+          </p:cNvSpPr>
+          <p:nvPr>
+            <p:ph idx="1"/>
+          </p:nvPr>
+        </p:nvSpPr>
+        <p:spPr/>
+        <p:txBody>
+          <a:bodyPr>
+            <a:normAutofit fontScale="85000" lnSpcReduction="20000"/>
+          </a:bodyPr>
+          <a:lstStyle/>
+          <a:p>
+            <a:r>
+              <a:rPr lang="nb-NO" dirty="0" err="1"/>
+              <a:t>I’m</a:t>
+            </a:r>
+            <a:r>
+              <a:rPr lang="nb-NO" dirty="0"/>
+              <a:t> planning to </a:t>
+            </a:r>
+            <a:r>
+              <a:rPr lang="nb-NO" dirty="0" err="1"/>
+              <a:t>schedule</a:t>
+            </a:r>
+            <a:r>
+              <a:rPr lang="nb-NO" dirty="0"/>
+              <a:t> a ML </a:t>
+            </a:r>
+            <a:r>
+              <a:rPr lang="nb-NO" dirty="0" err="1"/>
+              <a:t>meeting</a:t>
+            </a:r>
+            <a:r>
+              <a:rPr lang="nb-NO" dirty="0"/>
+              <a:t> in </a:t>
+            </a:r>
+            <a:r>
+              <a:rPr lang="nb-NO" dirty="0" err="1"/>
+              <a:t>two</a:t>
+            </a:r>
+            <a:r>
+              <a:rPr lang="nb-NO" dirty="0"/>
+              <a:t> </a:t>
+            </a:r>
+            <a:r>
+              <a:rPr lang="nb-NO" dirty="0" err="1"/>
+              <a:t>weeks</a:t>
+            </a:r>
+            <a:r>
+              <a:rPr lang="nb-NO" dirty="0"/>
+              <a:t> [14.09.2022]</a:t>
+            </a:r>
+            <a:endParaRPr lang="en-GB" dirty="0"/>
+          </a:p>
+          <a:p>
+            <a:r>
+              <a:rPr lang="en-GB" dirty="0"/>
+              <a:t>By then I want to have:</a:t>
+            </a:r>
+          </a:p>
+          <a:p>
+            <a:pPr lvl="1"/>
+            <a:r>
+              <a:rPr lang="en-GB" dirty="0"/>
+              <a:t>Implemented all needed architectures</a:t>
+            </a:r>
+          </a:p>
+          <a:p>
+            <a:pPr lvl="1"/>
+            <a:r>
+              <a:rPr lang="en-GB" dirty="0"/>
+              <a:t>Implemented transfer learning loss functions</a:t>
+            </a:r>
+          </a:p>
+          <a:p>
+            <a:pPr lvl="1"/>
+            <a:r>
+              <a:rPr lang="en-GB" dirty="0"/>
+              <a:t>Implemented logging script</a:t>
+            </a:r>
+          </a:p>
+          <a:p>
+            <a:pPr lvl="1"/>
+            <a:r>
+              <a:rPr lang="en-GB" dirty="0"/>
+              <a:t>Gotten familiar with loading the data from NGI’s TNW folder (</a:t>
+            </a:r>
+            <a:r>
+              <a:rPr lang="en-GB" dirty="0" err="1"/>
+              <a:t>OpendTect</a:t>
+            </a:r>
+            <a:r>
+              <a:rPr lang="en-GB" dirty="0"/>
+              <a:t> etc.)</a:t>
+            </a:r>
+          </a:p>
+          <a:p>
+            <a:pPr lvl="1"/>
+            <a:r>
+              <a:rPr lang="en-GB" dirty="0"/>
+              <a:t>Ran at least one algorithm with summary statistics</a:t>
+            </a:r>
+          </a:p>
+          <a:p>
+            <a:pPr lvl="1"/>
+            <a:endParaRPr lang="en-GB" dirty="0"/>
+          </a:p>
+          <a:p>
+            <a:r>
+              <a:rPr lang="en-GB" dirty="0"/>
+              <a:t>Or at the very least have better questions to ask for guidance</a:t>
+            </a:r>
+          </a:p>
+          <a:p>
+            <a:r>
+              <a:rPr lang="en-GB" dirty="0"/>
+              <a:t>Next general meeting in one month [06.10.2022]</a:t>
+            </a:r>
+          </a:p>
+          <a:p>
+            <a:pPr lvl="1"/>
+            <a:r>
+              <a:rPr lang="en-GB" dirty="0"/>
+              <a:t>It will be beneficial for me to give status updates along the way and sharing plans ahead</a:t>
+            </a:r>
+            <a:endParaRPr lang="nb-NO" dirty="0"/>
+          </a:p>
+        </p:txBody>
+      </p:sp>
+    </p:spTree>
+    <p:extLst>
+      <p:ext uri="{BB962C8B-B14F-4D97-AF65-F5344CB8AC3E}">
+        <p14:creationId xmlns:p14="http://schemas.microsoft.com/office/powerpoint/2010/main" val="2242473429"/>
+      </p:ext>
+    </p:extLst>
+  </p:cSld>
+  <p:clrMapOvr>
+    <a:masterClrMapping/>
+  </p:clrMapOvr>
+</p:sld>
+</file>
+
+<file path=ppt/slides/slide16.xml><?xml version="1.0" encoding="utf-8"?>
+<p:sld xmlns:a="http://schemas.openxmlformats.org/drawingml/2006/main" xmlns:r="http://schemas.openxmlformats.org/officeDocument/2006/relationships" xmlns:p="http://schemas.openxmlformats.org/presentationml/2006/main">
+  <p:cSld>
+    <p:spTree>
+      <p:nvGrpSpPr>
+        <p:cNvPr id="1" name=""/>
+        <p:cNvGrpSpPr/>
+        <p:nvPr/>
+      </p:nvGrpSpPr>
+      <p:grpSpPr>
+        <a:xfrm>
+          <a:off x="0" y="0"/>
+          <a:ext cx="0" cy="0"/>
+          <a:chOff x="0" y="0"/>
+          <a:chExt cx="0" cy="0"/>
+        </a:xfrm>
+      </p:grpSpPr>
+      <p:sp>
+        <p:nvSpPr>
           <p:cNvPr id="4" name="Title 3">
             <a:extLst>
               <a:ext uri="{FF2B5EF4-FFF2-40B4-BE49-F238E27FC236}">
@@ -8207,7 +8401,7 @@
 </p:sld>
 </file>
 
-<file path=ppt/slides/slide16.xml><?xml version="1.0" encoding="utf-8"?>
+<file path=ppt/slides/slide17.xml><?xml version="1.0" encoding="utf-8"?>
 <p:sld xmlns:a="http://schemas.openxmlformats.org/drawingml/2006/main" xmlns:r="http://schemas.openxmlformats.org/officeDocument/2006/relationships" xmlns:p="http://schemas.openxmlformats.org/presentationml/2006/main">
   <p:cSld>
     <p:spTree>
@@ -11096,15 +11290,6 @@
 </file>
 
 <file path=customXml/item1.xml><?xml version="1.0" encoding="utf-8"?>
-<?mso-contentType ?>
-<FormTemplates xmlns="http://schemas.microsoft.com/sharepoint/v3/contenttype/forms">
-  <Display>DocumentLibraryForm</Display>
-  <Edit>DocumentLibraryForm</Edit>
-  <New>DocumentLibraryForm</New>
-</FormTemplates>
-</file>
-
-<file path=customXml/item2.xml><?xml version="1.0" encoding="utf-8"?>
 <ct:contentTypeSchema xmlns:ct="http://schemas.microsoft.com/office/2006/metadata/contentType" xmlns:ma="http://schemas.microsoft.com/office/2006/metadata/properties/metaAttributes" ct:_="" ma:_="" ma:contentTypeName="Dokument" ma:contentTypeID="0x010100529457019D10524BA2EE120DFA1AE6D8" ma:contentTypeVersion="12" ma:contentTypeDescription="Opprett et nytt dokument." ma:contentTypeScope="" ma:versionID="448971300e3e908049932ea285d6ac90">
   <xsd:schema xmlns:xsd="http://www.w3.org/2001/XMLSchema" xmlns:xs="http://www.w3.org/2001/XMLSchema" xmlns:p="http://schemas.microsoft.com/office/2006/metadata/properties" xmlns:ns3="a55fa175-6382-43b9-aff5-d7307f697fc1" xmlns:ns4="b9f3292d-4775-4e83-af09-7d60675e39f3" targetNamespace="http://schemas.microsoft.com/office/2006/metadata/properties" ma:root="true" ma:fieldsID="ff0424fa62092feeaa306be5d30ad0bc" ns3:_="" ns4:_="">
     <xsd:import namespace="a55fa175-6382-43b9-aff5-d7307f697fc1"/>
@@ -11321,6 +11506,15 @@
 </ct:contentTypeSchema>
 </file>
 
+<file path=customXml/item2.xml><?xml version="1.0" encoding="utf-8"?>
+<?mso-contentType ?>
+<FormTemplates xmlns="http://schemas.microsoft.com/sharepoint/v3/contenttype/forms">
+  <Display>DocumentLibraryForm</Display>
+  <Edit>DocumentLibraryForm</Edit>
+  <New>DocumentLibraryForm</New>
+</FormTemplates>
+</file>
+
 <file path=customXml/item3.xml><?xml version="1.0" encoding="utf-8"?>
 <p:properties xmlns:p="http://schemas.microsoft.com/office/2006/metadata/properties" xmlns:xsi="http://www.w3.org/2001/XMLSchema-instance" xmlns:pc="http://schemas.microsoft.com/office/infopath/2007/PartnerControls">
   <documentManagement/>
@@ -11328,14 +11522,6 @@
 </file>
 
 <file path=customXml/itemProps1.xml><?xml version="1.0" encoding="utf-8"?>
-<ds:datastoreItem xmlns:ds="http://schemas.openxmlformats.org/officeDocument/2006/customXml" ds:itemID="{A5C1D168-2A2F-4A76-B1FF-D0F26B96B617}">
-  <ds:schemaRefs>
-    <ds:schemaRef ds:uri="http://schemas.microsoft.com/sharepoint/v3/contenttype/forms"/>
-  </ds:schemaRefs>
-</ds:datastoreItem>
-</file>
-
-<file path=customXml/itemProps2.xml><?xml version="1.0" encoding="utf-8"?>
 <ds:datastoreItem xmlns:ds="http://schemas.openxmlformats.org/officeDocument/2006/customXml" ds:itemID="{F80D94FE-6C36-4EAD-9793-4895E298CF09}">
   <ds:schemaRefs>
     <ds:schemaRef ds:uri="http://schemas.microsoft.com/office/2006/metadata/contentType"/>
@@ -11350,6 +11536,14 @@
     <ds:schemaRef ds:uri="http://purl.org/dc/elements/1.1/"/>
     <ds:schemaRef ds:uri="http://purl.org/dc/terms/"/>
     <ds:schemaRef ds:uri="http://schemas.microsoft.com/internal/obd"/>
+  </ds:schemaRefs>
+</ds:datastoreItem>
+</file>
+
+<file path=customXml/itemProps2.xml><?xml version="1.0" encoding="utf-8"?>
+<ds:datastoreItem xmlns:ds="http://schemas.openxmlformats.org/officeDocument/2006/customXml" ds:itemID="{A5C1D168-2A2F-4A76-B1FF-D0F26B96B617}">
+  <ds:schemaRefs>
+    <ds:schemaRef ds:uri="http://schemas.microsoft.com/sharepoint/v3/contenttype/forms"/>
   </ds:schemaRefs>
 </ds:datastoreItem>
 </file>

</xml_diff>